<commit_message>
feat(NB): NB classifier and Dtrees
</commit_message>
<xml_diff>
--- a/PPTs/Types of Decision Trees.pptx
+++ b/PPTs/Types of Decision Trees.pptx
@@ -108,6 +108,11 @@
       </a:defRPr>
     </a:lvl9pPr>
   </p:defaultTextStyle>
+  <p:extLst>
+    <p:ext uri="{EFAFB233-063F-42B5-8137-9DF3F51BA10A}">
+      <p15:sldGuideLst xmlns:p15="http://schemas.microsoft.com/office/powerpoint/2012/main"/>
+    </p:ext>
+  </p:extLst>
 </p:presentation>
 </file>
 
@@ -242,7 +247,7 @@
           <a:p>
             <a:fld id="{6EABCA53-F4E7-4760-844D-1D90FFBCA891}" type="datetimeFigureOut">
               <a:rPr lang="en-US" smtClean="0"/>
-              <a:t>6/27/2020</a:t>
+              <a:t>10/13/2020</a:t>
             </a:fld>
             <a:endParaRPr lang="en-US"/>
           </a:p>
@@ -412,7 +417,7 @@
           <a:p>
             <a:fld id="{6EABCA53-F4E7-4760-844D-1D90FFBCA891}" type="datetimeFigureOut">
               <a:rPr lang="en-US" smtClean="0"/>
-              <a:t>6/27/2020</a:t>
+              <a:t>10/13/2020</a:t>
             </a:fld>
             <a:endParaRPr lang="en-US"/>
           </a:p>
@@ -592,7 +597,7 @@
           <a:p>
             <a:fld id="{6EABCA53-F4E7-4760-844D-1D90FFBCA891}" type="datetimeFigureOut">
               <a:rPr lang="en-US" smtClean="0"/>
-              <a:t>6/27/2020</a:t>
+              <a:t>10/13/2020</a:t>
             </a:fld>
             <a:endParaRPr lang="en-US"/>
           </a:p>
@@ -762,7 +767,7 @@
           <a:p>
             <a:fld id="{6EABCA53-F4E7-4760-844D-1D90FFBCA891}" type="datetimeFigureOut">
               <a:rPr lang="en-US" smtClean="0"/>
-              <a:t>6/27/2020</a:t>
+              <a:t>10/13/2020</a:t>
             </a:fld>
             <a:endParaRPr lang="en-US"/>
           </a:p>
@@ -1008,7 +1013,7 @@
           <a:p>
             <a:fld id="{6EABCA53-F4E7-4760-844D-1D90FFBCA891}" type="datetimeFigureOut">
               <a:rPr lang="en-US" smtClean="0"/>
-              <a:t>6/27/2020</a:t>
+              <a:t>10/13/2020</a:t>
             </a:fld>
             <a:endParaRPr lang="en-US"/>
           </a:p>
@@ -1240,7 +1245,7 @@
           <a:p>
             <a:fld id="{6EABCA53-F4E7-4760-844D-1D90FFBCA891}" type="datetimeFigureOut">
               <a:rPr lang="en-US" smtClean="0"/>
-              <a:t>6/27/2020</a:t>
+              <a:t>10/13/2020</a:t>
             </a:fld>
             <a:endParaRPr lang="en-US"/>
           </a:p>
@@ -1607,7 +1612,7 @@
           <a:p>
             <a:fld id="{6EABCA53-F4E7-4760-844D-1D90FFBCA891}" type="datetimeFigureOut">
               <a:rPr lang="en-US" smtClean="0"/>
-              <a:t>6/27/2020</a:t>
+              <a:t>10/13/2020</a:t>
             </a:fld>
             <a:endParaRPr lang="en-US"/>
           </a:p>
@@ -1725,7 +1730,7 @@
           <a:p>
             <a:fld id="{6EABCA53-F4E7-4760-844D-1D90FFBCA891}" type="datetimeFigureOut">
               <a:rPr lang="en-US" smtClean="0"/>
-              <a:t>6/27/2020</a:t>
+              <a:t>10/13/2020</a:t>
             </a:fld>
             <a:endParaRPr lang="en-US"/>
           </a:p>
@@ -1820,7 +1825,7 @@
           <a:p>
             <a:fld id="{6EABCA53-F4E7-4760-844D-1D90FFBCA891}" type="datetimeFigureOut">
               <a:rPr lang="en-US" smtClean="0"/>
-              <a:t>6/27/2020</a:t>
+              <a:t>10/13/2020</a:t>
             </a:fld>
             <a:endParaRPr lang="en-US"/>
           </a:p>
@@ -2097,7 +2102,7 @@
           <a:p>
             <a:fld id="{6EABCA53-F4E7-4760-844D-1D90FFBCA891}" type="datetimeFigureOut">
               <a:rPr lang="en-US" smtClean="0"/>
-              <a:t>6/27/2020</a:t>
+              <a:t>10/13/2020</a:t>
             </a:fld>
             <a:endParaRPr lang="en-US"/>
           </a:p>
@@ -2350,7 +2355,7 @@
           <a:p>
             <a:fld id="{6EABCA53-F4E7-4760-844D-1D90FFBCA891}" type="datetimeFigureOut">
               <a:rPr lang="en-US" smtClean="0"/>
-              <a:t>6/27/2020</a:t>
+              <a:t>10/13/2020</a:t>
             </a:fld>
             <a:endParaRPr lang="en-US"/>
           </a:p>
@@ -2563,7 +2568,7 @@
           <a:p>
             <a:fld id="{6EABCA53-F4E7-4760-844D-1D90FFBCA891}" type="datetimeFigureOut">
               <a:rPr lang="en-US" smtClean="0"/>
-              <a:t>6/27/2020</a:t>
+              <a:t>10/13/2020</a:t>
             </a:fld>
             <a:endParaRPr lang="en-US"/>
           </a:p>
@@ -3024,7 +3029,7 @@
           <a:p>
             <a:pPr lvl="1"/>
             <a:r>
-              <a:rPr lang="en-US" dirty="0" smtClean="0"/>
+              <a:rPr lang="en-US" b="1" dirty="0" smtClean="0"/>
               <a:t>Entropy</a:t>
             </a:r>
           </a:p>
@@ -3043,11 +3048,7 @@
             <a:pPr lvl="1"/>
             <a:r>
               <a:rPr lang="en-US" dirty="0" smtClean="0"/>
-              <a:t>E—</a:t>
-            </a:r>
-            <a:r>
-              <a:rPr lang="en-US" dirty="0" err="1" smtClean="0"/>
-              <a:t>chind</a:t>
+              <a:t>E—child</a:t>
             </a:r>
             <a:endParaRPr lang="en-US" dirty="0" smtClean="0"/>
           </a:p>
@@ -3059,8 +3060,21 @@
             <a:pPr lvl="1"/>
             <a:r>
               <a:rPr lang="en-US" dirty="0" smtClean="0"/>
-              <a:t>Information gain = E(P)-E© == .2</a:t>
-            </a:r>
+              <a:t>Information gain = E(P</a:t>
+            </a:r>
+            <a:r>
+              <a:rPr lang="en-US" dirty="0" smtClean="0"/>
+              <a:t>)-E(C)  </a:t>
+            </a:r>
+            <a:r>
+              <a:rPr lang="en-US" dirty="0" smtClean="0"/>
+              <a:t>== </a:t>
+            </a:r>
+            <a:r>
+              <a:rPr lang="en-US" dirty="0" smtClean="0"/>
+              <a:t>0.2</a:t>
+            </a:r>
+            <a:endParaRPr lang="en-US" dirty="0" smtClean="0"/>
           </a:p>
           <a:p>
             <a:pPr lvl="1"/>
@@ -3073,8 +3087,13 @@
           <a:p>
             <a:r>
               <a:rPr lang="en-US" dirty="0" smtClean="0"/>
-              <a:t>C4.5 --- C5.0  ---   GAIN RATIO------</a:t>
-            </a:r>
+              <a:t>C4.5 --- C5.0  ---   GAIN RATIO-</a:t>
+            </a:r>
+            <a:r>
+              <a:rPr lang="en-US" dirty="0" smtClean="0"/>
+              <a:t>----- IG</a:t>
+            </a:r>
+            <a:endParaRPr lang="en-US" dirty="0" smtClean="0"/>
           </a:p>
           <a:p>
             <a:endParaRPr lang="en-US" dirty="0" smtClean="0"/>
@@ -3120,12 +3139,12 @@
               <a:t> [</a:t>
             </a:r>
             <a:r>
-              <a:rPr lang="en-US" dirty="0" err="1" smtClean="0"/>
-              <a:t>Clasification</a:t>
-            </a:r>
-            <a:r>
               <a:rPr lang="en-US" dirty="0" smtClean="0"/>
-              <a:t> ]</a:t>
+              <a:t>Classification </a:t>
+            </a:r>
+            <a:r>
+              <a:rPr lang="en-US" dirty="0" smtClean="0"/>
+              <a:t>]</a:t>
             </a:r>
           </a:p>
           <a:p>

</xml_diff>